<commit_message>
Completed index slide and made small design and spelling changes
</commit_message>
<xml_diff>
--- a/The Little Green Web App - Copy.pptx
+++ b/The Little Green Web App - Copy.pptx
@@ -401,7 +401,7 @@
           <a:p>
             <a:fld id="{AF239A9A-B4B0-4B32-B8CD-2E25E95134C4}" type="datetimeFigureOut">
               <a:rPr lang="en-US" dirty="0"/>
-              <a:t>12/1/2019</a:t>
+              <a:t>12/2/2019</a:t>
             </a:fld>
             <a:endParaRPr lang="en-US" dirty="0"/>
           </a:p>
@@ -810,7 +810,7 @@
           <a:p>
             <a:fld id="{F25518A9-B687-4302-9395-2322403C6656}" type="datetimeFigureOut">
               <a:rPr lang="en-US" dirty="0"/>
-              <a:t>12/1/2019</a:t>
+              <a:t>12/2/2019</a:t>
             </a:fld>
             <a:endParaRPr lang="en-US" dirty="0"/>
           </a:p>
@@ -1141,7 +1141,7 @@
           <a:p>
             <a:fld id="{1A99A684-0CB7-41E9-A4DF-5D1C2CA5BF6F}" type="datetimeFigureOut">
               <a:rPr lang="en-US" dirty="0"/>
-              <a:t>12/1/2019</a:t>
+              <a:t>12/2/2019</a:t>
             </a:fld>
             <a:endParaRPr lang="en-US" dirty="0"/>
           </a:p>
@@ -1541,7 +1541,7 @@
           <a:p>
             <a:fld id="{FEDD7C35-9E19-4518-A4B2-3B09CD8CC756}" type="datetimeFigureOut">
               <a:rPr lang="en-US" dirty="0"/>
-              <a:t>12/1/2019</a:t>
+              <a:t>12/2/2019</a:t>
             </a:fld>
             <a:endParaRPr lang="en-US" dirty="0"/>
           </a:p>
@@ -2104,7 +2104,7 @@
           <a:p>
             <a:fld id="{26196DA8-8897-4DDF-BFB6-5D83863C837A}" type="datetimeFigureOut">
               <a:rPr lang="en-US" dirty="0"/>
-              <a:t>12/1/2019</a:t>
+              <a:t>12/2/2019</a:t>
             </a:fld>
             <a:endParaRPr lang="en-US" dirty="0"/>
           </a:p>
@@ -2780,7 +2780,7 @@
           <a:p>
             <a:fld id="{DCBBA708-C5F0-412D-90E2-1919F0D196AE}" type="datetimeFigureOut">
               <a:rPr lang="en-US" dirty="0"/>
-              <a:t>12/1/2019</a:t>
+              <a:t>12/2/2019</a:t>
             </a:fld>
             <a:endParaRPr lang="en-US" dirty="0"/>
           </a:p>
@@ -3688,7 +3688,7 @@
           <a:p>
             <a:fld id="{A9C8F8FA-EF43-4642-9368-3F4E33039BD9}" type="datetimeFigureOut">
               <a:rPr lang="en-US" dirty="0"/>
-              <a:t>12/1/2019</a:t>
+              <a:t>12/2/2019</a:t>
             </a:fld>
             <a:endParaRPr lang="en-US" dirty="0"/>
           </a:p>
@@ -3996,7 +3996,7 @@
           <a:p>
             <a:fld id="{6B61E721-B01C-4D5D-A3CA-2E5518383F10}" type="datetimeFigureOut">
               <a:rPr lang="en-US" dirty="0"/>
-              <a:t>12/1/2019</a:t>
+              <a:t>12/2/2019</a:t>
             </a:fld>
             <a:endParaRPr lang="en-US" dirty="0"/>
           </a:p>
@@ -4255,7 +4255,7 @@
           <a:p>
             <a:fld id="{6513FEF9-69D0-4F8C-A336-59491FBEDC47}" type="datetimeFigureOut">
               <a:rPr lang="en-US" dirty="0"/>
-              <a:t>12/1/2019</a:t>
+              <a:t>12/2/2019</a:t>
             </a:fld>
             <a:endParaRPr lang="en-US" dirty="0"/>
           </a:p>
@@ -4592,7 +4592,7 @@
           <a:p>
             <a:fld id="{A91E21DC-8981-44E6-BC8C-2BA8F673FFBB}" type="datetimeFigureOut">
               <a:rPr lang="en-US" dirty="0"/>
-              <a:t>12/1/2019</a:t>
+              <a:t>12/2/2019</a:t>
             </a:fld>
             <a:endParaRPr lang="en-US" dirty="0"/>
           </a:p>
@@ -4976,7 +4976,7 @@
           <a:p>
             <a:fld id="{AEB9C5D3-0140-4E75-8D7F-C0623D06DFD7}" type="datetimeFigureOut">
               <a:rPr lang="en-US" dirty="0"/>
-              <a:t>12/1/2019</a:t>
+              <a:t>12/2/2019</a:t>
             </a:fld>
             <a:endParaRPr lang="en-US" dirty="0"/>
           </a:p>
@@ -5347,7 +5347,7 @@
           <a:p>
             <a:fld id="{3A5666F9-5B40-48E0-8DFD-99EF944CDD22}" type="datetimeFigureOut">
               <a:rPr lang="en-US" dirty="0"/>
-              <a:t>12/1/2019</a:t>
+              <a:t>12/2/2019</a:t>
             </a:fld>
             <a:endParaRPr lang="en-US" dirty="0"/>
           </a:p>
@@ -5848,7 +5848,7 @@
           <a:p>
             <a:fld id="{2A698D6B-2C72-4E21-9893-A649C6E2A47D}" type="datetimeFigureOut">
               <a:rPr lang="en-US" dirty="0"/>
-              <a:t>12/1/2019</a:t>
+              <a:t>12/2/2019</a:t>
             </a:fld>
             <a:endParaRPr lang="en-US" dirty="0"/>
           </a:p>
@@ -6100,7 +6100,7 @@
           <a:p>
             <a:fld id="{C86811C9-A66C-49F0-970E-F7B68D9109A0}" type="datetimeFigureOut">
               <a:rPr lang="en-US" dirty="0"/>
-              <a:t>12/1/2019</a:t>
+              <a:t>12/2/2019</a:t>
             </a:fld>
             <a:endParaRPr lang="en-US" dirty="0"/>
           </a:p>
@@ -6258,7 +6258,7 @@
           <a:p>
             <a:fld id="{6C01AE78-96A2-4A23-B183-3B6DB4374FE7}" type="datetimeFigureOut">
               <a:rPr lang="en-US" dirty="0"/>
-              <a:t>12/1/2019</a:t>
+              <a:t>12/2/2019</a:t>
             </a:fld>
             <a:endParaRPr lang="en-US" dirty="0"/>
           </a:p>
@@ -6643,7 +6643,7 @@
           <a:p>
             <a:fld id="{73AE0757-B101-4811-9189-10EB2F458E2D}" type="datetimeFigureOut">
               <a:rPr lang="en-US" dirty="0"/>
-              <a:t>12/1/2019</a:t>
+              <a:t>12/2/2019</a:t>
             </a:fld>
             <a:endParaRPr lang="en-US" dirty="0"/>
           </a:p>
@@ -7047,7 +7047,7 @@
           <a:p>
             <a:fld id="{7EBDC078-589F-40E3-816C-EE21D62B5BBA}" type="datetimeFigureOut">
               <a:rPr lang="en-US" dirty="0"/>
-              <a:t>12/1/2019</a:t>
+              <a:t>12/2/2019</a:t>
             </a:fld>
             <a:endParaRPr lang="en-US" dirty="0"/>
           </a:p>
@@ -7286,7 +7286,7 @@
           <a:p>
             <a:fld id="{C7004436-CA73-4D53-89B4-2A5C7347BF2F}" type="datetimeFigureOut">
               <a:rPr lang="en-US" dirty="0"/>
-              <a:t>12/1/2019</a:t>
+              <a:t>12/2/2019</a:t>
             </a:fld>
             <a:endParaRPr lang="en-US" dirty="0"/>
           </a:p>
@@ -7983,12 +7983,71 @@
           </a:p>
         </p:txBody>
       </p:sp>
+      <p:sp>
+        <p:nvSpPr>
+          <p:cNvPr id="4" name="Text Placeholder 3">
+            <a:extLst>
+              <a:ext uri="{FF2B5EF4-FFF2-40B4-BE49-F238E27FC236}">
+                <a16:creationId xmlns:a16="http://schemas.microsoft.com/office/drawing/2014/main" id="{6ACF03E3-D9CA-488F-9043-C319AB695E8E}"/>
+              </a:ext>
+            </a:extLst>
+          </p:cNvPr>
+          <p:cNvSpPr>
+            <a:spLocks noGrp="1"/>
+          </p:cNvSpPr>
+          <p:nvPr>
+            <p:ph type="body" sz="half" idx="2"/>
+          </p:nvPr>
+        </p:nvSpPr>
+        <p:spPr/>
+        <p:txBody>
+          <a:bodyPr/>
+          <a:lstStyle/>
+          <a:p>
+            <a:pPr marL="285750" indent="-285750" algn="just">
+              <a:buFont typeface="Arial" panose="020B0604020202020204" pitchFamily="34" charset="0"/>
+              <a:buChar char="•"/>
+            </a:pPr>
+            <a:r>
+              <a:rPr lang="en-GB" sz="2000" dirty="0"/>
+              <a:t>The purpose of our home page is to  explain the functions of the site.</a:t>
+            </a:r>
+          </a:p>
+          <a:p>
+            <a:pPr marL="285750" indent="-285750" algn="just">
+              <a:buFont typeface="Arial" panose="020B0604020202020204" pitchFamily="34" charset="0"/>
+              <a:buChar char="•"/>
+            </a:pPr>
+            <a:r>
+              <a:rPr lang="en-GB" sz="2000" dirty="0"/>
+              <a:t>It also provides some facts about waste and the environment.</a:t>
+            </a:r>
+          </a:p>
+          <a:p>
+            <a:pPr marL="285750" indent="-285750" algn="just">
+              <a:buFont typeface="Arial" panose="020B0604020202020204" pitchFamily="34" charset="0"/>
+              <a:buChar char="•"/>
+            </a:pPr>
+            <a:r>
+              <a:rPr lang="en-GB" sz="2000" dirty="0"/>
+              <a:t>It provides links to websites and charities</a:t>
+            </a:r>
+          </a:p>
+          <a:p>
+            <a:pPr marL="285750" indent="-285750">
+              <a:buFont typeface="Arial" panose="020B0604020202020204" pitchFamily="34" charset="0"/>
+              <a:buChar char="•"/>
+            </a:pPr>
+            <a:endParaRPr lang="en-GB" dirty="0"/>
+          </a:p>
+        </p:txBody>
+      </p:sp>
       <p:pic>
         <p:nvPicPr>
-          <p:cNvPr id="7" name="Content Placeholder 6">
+          <p:cNvPr id="6" name="Content Placeholder 5">
             <a:extLst>
               <a:ext uri="{FF2B5EF4-FFF2-40B4-BE49-F238E27FC236}">
-                <a16:creationId xmlns:a16="http://schemas.microsoft.com/office/drawing/2014/main" id="{8BC49CF2-1801-49EC-AC90-29426AC08C92}"/>
+                <a16:creationId xmlns:a16="http://schemas.microsoft.com/office/drawing/2014/main" id="{E23C52C4-6A74-4249-9642-A5E1EB8EEFD2}"/>
               </a:ext>
             </a:extLst>
           </p:cNvPr>
@@ -8007,39 +8066,14 @@
         </p:blipFill>
         <p:spPr>
           <a:xfrm>
-            <a:off x="4686300" y="2845237"/>
-            <a:ext cx="5608638" cy="2581989"/>
+            <a:off x="4686300" y="2558802"/>
+            <a:ext cx="5608638" cy="3154858"/>
           </a:xfrm>
           <a:prstGeom prst="rect">
             <a:avLst/>
           </a:prstGeom>
         </p:spPr>
       </p:pic>
-      <p:sp>
-        <p:nvSpPr>
-          <p:cNvPr id="4" name="Text Placeholder 3">
-            <a:extLst>
-              <a:ext uri="{FF2B5EF4-FFF2-40B4-BE49-F238E27FC236}">
-                <a16:creationId xmlns:a16="http://schemas.microsoft.com/office/drawing/2014/main" id="{6ACF03E3-D9CA-488F-9043-C319AB695E8E}"/>
-              </a:ext>
-            </a:extLst>
-          </p:cNvPr>
-          <p:cNvSpPr>
-            <a:spLocks noGrp="1"/>
-          </p:cNvSpPr>
-          <p:nvPr>
-            <p:ph type="body" sz="half" idx="2"/>
-          </p:nvPr>
-        </p:nvSpPr>
-        <p:spPr/>
-        <p:txBody>
-          <a:bodyPr/>
-          <a:lstStyle/>
-          <a:p>
-            <a:endParaRPr lang="en-GB" dirty="0"/>
-          </a:p>
-        </p:txBody>
-      </p:sp>
     </p:spTree>
     <p:extLst>
       <p:ext uri="{BB962C8B-B14F-4D97-AF65-F5344CB8AC3E}">
@@ -8148,35 +8182,37 @@
         </p:nvSpPr>
         <p:spPr/>
         <p:txBody>
-          <a:bodyPr/>
+          <a:bodyPr>
+            <a:normAutofit/>
+          </a:bodyPr>
           <a:lstStyle/>
           <a:p>
-            <a:pPr marL="285750" indent="-285750">
+            <a:pPr marL="285750" indent="-285750" algn="just">
               <a:buFont typeface="Arial" panose="020B0604020202020204" pitchFamily="34" charset="0"/>
               <a:buChar char="•"/>
             </a:pPr>
             <a:r>
-              <a:rPr lang="en-GB" dirty="0"/>
-              <a:t>The quiz ask 6 questions, from 6 different topics  in eco-friendly living</a:t>
-            </a:r>
-          </a:p>
-          <a:p>
-            <a:pPr marL="285750" indent="-285750">
+              <a:rPr lang="en-GB" sz="2000" dirty="0"/>
+              <a:t>The quiz asks 6 questions, from 6 different topics in eco-friendly living</a:t>
+            </a:r>
+          </a:p>
+          <a:p>
+            <a:pPr marL="285750" indent="-285750" algn="just">
               <a:buFont typeface="Arial" panose="020B0604020202020204" pitchFamily="34" charset="0"/>
               <a:buChar char="•"/>
             </a:pPr>
             <a:r>
-              <a:rPr lang="en-GB" dirty="0"/>
-              <a:t>The quiz gives an individual response depending on what you answer in each question</a:t>
-            </a:r>
-          </a:p>
-          <a:p>
-            <a:pPr marL="285750" indent="-285750">
+              <a:rPr lang="en-GB" sz="2000" dirty="0"/>
+              <a:t>The quiz gives individual responses depending on what you answered in each question</a:t>
+            </a:r>
+          </a:p>
+          <a:p>
+            <a:pPr marL="285750" indent="-285750" algn="just">
               <a:buFont typeface="Arial" panose="020B0604020202020204" pitchFamily="34" charset="0"/>
               <a:buChar char="•"/>
             </a:pPr>
             <a:r>
-              <a:rPr lang="en-GB" dirty="0"/>
+              <a:rPr lang="en-GB" sz="2000" dirty="0"/>
               <a:t>Links to other advice pages</a:t>
             </a:r>
           </a:p>
@@ -8286,7 +8322,7 @@
           <a:bodyPr/>
           <a:lstStyle/>
           <a:p>
-            <a:endParaRPr lang="en-GB"/>
+            <a:endParaRPr lang="en-GB" dirty="0"/>
           </a:p>
         </p:txBody>
       </p:sp>

</xml_diff>

<commit_message>
finished the script and powerpoint presentation
</commit_message>
<xml_diff>
--- a/The Little Green Web App - Copy.pptx
+++ b/The Little Green Web App - Copy.pptx
@@ -7786,13 +7786,8 @@
           <a:p>
             <a:r>
               <a:rPr lang="en-GB" dirty="0"/>
-              <a:t>Jonas M. Olsson, John Harrow and Jack </a:t>
-            </a:r>
-            <a:r>
-              <a:rPr lang="en-GB" dirty="0" err="1"/>
-              <a:t>Wier</a:t>
-            </a:r>
-            <a:endParaRPr lang="en-GB" dirty="0"/>
+              <a:t>Jonas M. Olsson, John Harrow and Jack Weir</a:t>
+            </a:r>
           </a:p>
         </p:txBody>
       </p:sp>
@@ -7893,7 +7888,7 @@
             </a:pPr>
             <a:r>
               <a:rPr lang="en-GB" dirty="0"/>
-              <a:t>Mixes fun, information and a map</a:t>
+              <a:t>To provide information about services in the Dundee area.</a:t>
             </a:r>
           </a:p>
           <a:p>
@@ -8276,31 +8271,38 @@
           </a:p>
         </p:txBody>
       </p:sp>
-      <p:sp>
-        <p:nvSpPr>
-          <p:cNvPr id="3" name="Content Placeholder 2">
+      <p:pic>
+        <p:nvPicPr>
+          <p:cNvPr id="5" name="Content Placeholder 4">
             <a:extLst>
               <a:ext uri="{FF2B5EF4-FFF2-40B4-BE49-F238E27FC236}">
-                <a16:creationId xmlns:a16="http://schemas.microsoft.com/office/drawing/2014/main" id="{F406220C-2A0E-4477-966B-152725BF498B}"/>
+                <a16:creationId xmlns:a16="http://schemas.microsoft.com/office/drawing/2014/main" id="{A2FAFAF0-8106-4D9F-86FC-8DB013ABE173}"/>
               </a:ext>
             </a:extLst>
           </p:cNvPr>
-          <p:cNvSpPr>
-            <a:spLocks noGrp="1"/>
-          </p:cNvSpPr>
+          <p:cNvPicPr>
+            <a:picLocks noGrp="1" noChangeAspect="1"/>
+          </p:cNvPicPr>
           <p:nvPr>
             <p:ph idx="1"/>
           </p:nvPr>
-        </p:nvSpPr>
-        <p:spPr/>
-        <p:txBody>
-          <a:bodyPr/>
-          <a:lstStyle/>
-          <a:p>
-            <a:endParaRPr lang="en-GB"/>
-          </a:p>
-        </p:txBody>
-      </p:sp>
+        </p:nvPicPr>
+        <p:blipFill>
+          <a:blip r:embed="rId2"/>
+          <a:stretch>
+            <a:fillRect/>
+          </a:stretch>
+        </p:blipFill>
+        <p:spPr>
+          <a:xfrm>
+            <a:off x="4686300" y="2558802"/>
+            <a:ext cx="5608638" cy="3154858"/>
+          </a:xfrm>
+          <a:prstGeom prst="rect">
+            <a:avLst/>
+          </a:prstGeom>
+        </p:spPr>
+      </p:pic>
       <p:sp>
         <p:nvSpPr>
           <p:cNvPr id="4" name="Text Placeholder 3">
@@ -8319,10 +8321,29 @@
         </p:nvSpPr>
         <p:spPr/>
         <p:txBody>
-          <a:bodyPr/>
+          <a:bodyPr>
+            <a:normAutofit/>
+          </a:bodyPr>
           <a:lstStyle/>
           <a:p>
-            <a:endParaRPr lang="en-GB" dirty="0"/>
+            <a:pPr marL="285750" indent="-285750" algn="just">
+              <a:buFont typeface="Arial" panose="020B0604020202020204" pitchFamily="34" charset="0"/>
+              <a:buChar char="•"/>
+            </a:pPr>
+            <a:r>
+              <a:rPr lang="en-GB" sz="2000" dirty="0"/>
+              <a:t>Purpose is to show the user establishments in the Dundee area that provide eco-friendly services.</a:t>
+            </a:r>
+          </a:p>
+          <a:p>
+            <a:pPr marL="285750" indent="-285750" algn="just">
+              <a:buFont typeface="Arial" panose="020B0604020202020204" pitchFamily="34" charset="0"/>
+              <a:buChar char="•"/>
+            </a:pPr>
+            <a:r>
+              <a:rPr lang="en-GB" sz="2000" dirty="0"/>
+              <a:t>It also has information on why the establishments are eco-friendly and what services they provide.</a:t>
+            </a:r>
           </a:p>
         </p:txBody>
       </p:sp>
@@ -8384,31 +8405,38 @@
           </a:p>
         </p:txBody>
       </p:sp>
-      <p:sp>
-        <p:nvSpPr>
-          <p:cNvPr id="3" name="Content Placeholder 2">
+      <p:pic>
+        <p:nvPicPr>
+          <p:cNvPr id="5" name="Content Placeholder 4">
             <a:extLst>
               <a:ext uri="{FF2B5EF4-FFF2-40B4-BE49-F238E27FC236}">
-                <a16:creationId xmlns:a16="http://schemas.microsoft.com/office/drawing/2014/main" id="{E100902F-6C40-4A13-9B6F-8A56A1164029}"/>
+                <a16:creationId xmlns:a16="http://schemas.microsoft.com/office/drawing/2014/main" id="{A3D0455B-3635-400A-A71D-DEB6E3F59726}"/>
               </a:ext>
             </a:extLst>
           </p:cNvPr>
-          <p:cNvSpPr>
-            <a:spLocks noGrp="1"/>
-          </p:cNvSpPr>
+          <p:cNvPicPr>
+            <a:picLocks noGrp="1" noChangeAspect="1"/>
+          </p:cNvPicPr>
           <p:nvPr>
             <p:ph idx="1"/>
           </p:nvPr>
-        </p:nvSpPr>
-        <p:spPr/>
-        <p:txBody>
-          <a:bodyPr/>
-          <a:lstStyle/>
-          <a:p>
-            <a:endParaRPr lang="en-GB"/>
-          </a:p>
-        </p:txBody>
-      </p:sp>
+        </p:nvPicPr>
+        <p:blipFill>
+          <a:blip r:embed="rId2"/>
+          <a:stretch>
+            <a:fillRect/>
+          </a:stretch>
+        </p:blipFill>
+        <p:spPr>
+          <a:xfrm>
+            <a:off x="4686300" y="2558802"/>
+            <a:ext cx="5608638" cy="3154858"/>
+          </a:xfrm>
+          <a:prstGeom prst="rect">
+            <a:avLst/>
+          </a:prstGeom>
+        </p:spPr>
+      </p:pic>
       <p:sp>
         <p:nvSpPr>
           <p:cNvPr id="4" name="Text Placeholder 3">
@@ -8427,10 +8455,29 @@
         </p:nvSpPr>
         <p:spPr/>
         <p:txBody>
-          <a:bodyPr/>
+          <a:bodyPr>
+            <a:normAutofit/>
+          </a:bodyPr>
           <a:lstStyle/>
           <a:p>
-            <a:endParaRPr lang="en-GB"/>
+            <a:pPr marL="285750" indent="-285750" algn="just">
+              <a:buFont typeface="Arial" panose="020B0604020202020204" pitchFamily="34" charset="0"/>
+              <a:buChar char="•"/>
+            </a:pPr>
+            <a:r>
+              <a:rPr lang="en-GB" sz="2000" dirty="0"/>
+              <a:t>We have not yet implemented this part however the idea is that it will be recipes that we have already received from the little green larder on a carousel.</a:t>
+            </a:r>
+          </a:p>
+          <a:p>
+            <a:pPr marL="285750" indent="-285750" algn="just">
+              <a:buFont typeface="Arial" panose="020B0604020202020204" pitchFamily="34" charset="0"/>
+              <a:buChar char="•"/>
+            </a:pPr>
+            <a:r>
+              <a:rPr lang="en-GB" sz="2000" dirty="0"/>
+              <a:t>This will provide the user with information on how to use the produce they have purchased from there.</a:t>
+            </a:r>
           </a:p>
         </p:txBody>
       </p:sp>

</xml_diff>